<commit_message>
updated notebooks after todays final session
</commit_message>
<xml_diff>
--- a/Programming Tutorial.pptx
+++ b/Programming Tutorial.pptx
@@ -684,7 +684,7 @@
           <a:p>
             <a:fld id="{041DCD43-2D46-4F8F-A5DD-26B42E953E0E}" type="datetimeFigureOut">
               <a:rPr lang="de-DE" smtClean="0"/>
-              <a:t>29.11.21</a:t>
+              <a:t>01.12.21</a:t>
             </a:fld>
             <a:endParaRPr lang="de-DE"/>
           </a:p>
@@ -7093,7 +7093,7 @@
         <p:spPr>
           <a:xfrm>
             <a:off x="2222858" y="4481218"/>
-            <a:ext cx="4601817" cy="1038312"/>
+            <a:ext cx="4601817" cy="681417"/>
           </a:xfrm>
           <a:prstGeom prst="roundRect">
             <a:avLst>
@@ -7149,8 +7149,8 @@
         </p:nvSpPr>
         <p:spPr>
           <a:xfrm>
-            <a:off x="2222858" y="5528138"/>
-            <a:ext cx="4601817" cy="681417"/>
+            <a:off x="2222858" y="5171244"/>
+            <a:ext cx="4601817" cy="1038311"/>
           </a:xfrm>
           <a:prstGeom prst="roundRect">
             <a:avLst>
@@ -7393,10 +7393,9 @@
               <a:buAutoNum type="arabicPeriod"/>
             </a:pPr>
             <a:r>
-              <a:rPr lang="de-DE" b="1"/>
+              <a:rPr lang="de-DE" b="1" dirty="0"/>
               <a:t>Part:</a:t>
             </a:r>
-            <a:endParaRPr lang="de-DE" b="1" dirty="0"/>
           </a:p>
           <a:p>
             <a:pPr marL="612900" lvl="1" indent="-342900">
@@ -7565,26 +7564,6 @@
             <a:endParaRPr lang="de-DE" b="1" dirty="0"/>
           </a:p>
           <a:p>
-            <a:pPr marL="612900" lvl="1" indent="-342900">
-              <a:lnSpc>
-                <a:spcPts val="2700"/>
-              </a:lnSpc>
-            </a:pPr>
-            <a:r>
-              <a:rPr lang="de-DE" dirty="0" err="1"/>
-              <a:t>Implement</a:t>
-            </a:r>
-            <a:r>
-              <a:rPr lang="de-DE" dirty="0"/>
-              <a:t> a SAS </a:t>
-            </a:r>
-            <a:r>
-              <a:rPr lang="de-DE" dirty="0" err="1"/>
-              <a:t>model</a:t>
-            </a:r>
-            <a:endParaRPr lang="de-DE" dirty="0"/>
-          </a:p>
-          <a:p>
             <a:pPr marL="342900" indent="-342900">
               <a:lnSpc>
                 <a:spcPts val="2700"/>
@@ -7596,6 +7575,26 @@
               <a:rPr lang="de-DE" b="1" dirty="0"/>
               <a:t>Part:</a:t>
             </a:r>
+          </a:p>
+          <a:p>
+            <a:pPr marL="612900" lvl="1" indent="-342900">
+              <a:lnSpc>
+                <a:spcPts val="2700"/>
+              </a:lnSpc>
+            </a:pPr>
+            <a:r>
+              <a:rPr lang="de-DE" dirty="0" err="1"/>
+              <a:t>Implement</a:t>
+            </a:r>
+            <a:r>
+              <a:rPr lang="de-DE" dirty="0"/>
+              <a:t> a SAS </a:t>
+            </a:r>
+            <a:r>
+              <a:rPr lang="de-DE" dirty="0" err="1"/>
+              <a:t>model</a:t>
+            </a:r>
+            <a:endParaRPr lang="de-DE" dirty="0"/>
           </a:p>
           <a:p>
             <a:pPr marL="612900" lvl="1" indent="-342900">

</xml_diff>